<commit_message>
Fixes to PieCharts, Added Pie Charts
</commit_message>
<xml_diff>
--- a/Images/Figures_PPT/Jitter_Plot_Rictor_All.pptx
+++ b/Images/Figures_PPT/Jitter_Plot_Rictor_All.pptx
@@ -2359,7 +2359,7 @@
           </p:nvSpPr>
           <p:spPr>
             <a:xfrm>
-              <a:off x="1459435" y="6460539"/>
+              <a:off x="1459435" y="6460634"/>
               <a:ext cx="1650203" cy="0"/>
             </a:xfrm>
             <a:custGeom>
@@ -2402,7 +2402,7 @@
           </p:nvSpPr>
           <p:spPr>
             <a:xfrm>
-              <a:off x="1459435" y="5068390"/>
+              <a:off x="1459435" y="5068467"/>
               <a:ext cx="1650203" cy="0"/>
             </a:xfrm>
             <a:custGeom>
@@ -2445,7 +2445,7 @@
           </p:nvSpPr>
           <p:spPr>
             <a:xfrm>
-              <a:off x="1459435" y="3676241"/>
+              <a:off x="1459435" y="3676301"/>
               <a:ext cx="1650203" cy="0"/>
             </a:xfrm>
             <a:custGeom>
@@ -2488,7 +2488,7 @@
           </p:nvSpPr>
           <p:spPr>
             <a:xfrm>
-              <a:off x="1459435" y="2284092"/>
+              <a:off x="1459435" y="2284134"/>
               <a:ext cx="1650203" cy="0"/>
             </a:xfrm>
             <a:custGeom>
@@ -2531,7 +2531,7 @@
           </p:nvSpPr>
           <p:spPr>
             <a:xfrm>
-              <a:off x="1459435" y="5764465"/>
+              <a:off x="1459435" y="5764551"/>
               <a:ext cx="1650203" cy="0"/>
             </a:xfrm>
             <a:custGeom>
@@ -2574,7 +2574,7 @@
           </p:nvSpPr>
           <p:spPr>
             <a:xfrm>
-              <a:off x="1459435" y="4372316"/>
+              <a:off x="1459435" y="4372384"/>
               <a:ext cx="1650203" cy="0"/>
             </a:xfrm>
             <a:custGeom>
@@ -2617,7 +2617,7 @@
           </p:nvSpPr>
           <p:spPr>
             <a:xfrm>
-              <a:off x="1459435" y="2980167"/>
+              <a:off x="1459435" y="2980217"/>
               <a:ext cx="1650203" cy="0"/>
             </a:xfrm>
             <a:custGeom>
@@ -2660,7 +2660,7 @@
           </p:nvSpPr>
           <p:spPr>
             <a:xfrm>
-              <a:off x="1459435" y="1588018"/>
+              <a:off x="1459435" y="1588050"/>
               <a:ext cx="1650203" cy="0"/>
             </a:xfrm>
             <a:custGeom>
@@ -2832,7 +2832,7 @@
           </p:nvSpPr>
           <p:spPr>
             <a:xfrm>
-              <a:off x="2950285" y="6507322"/>
+              <a:off x="2924655" y="6507484"/>
               <a:ext cx="63202" cy="63202"/>
             </a:xfrm>
             <a:custGeom>
@@ -2875,7 +2875,7 @@
           </p:nvSpPr>
           <p:spPr>
             <a:xfrm>
-              <a:off x="2276656" y="5135573"/>
+              <a:off x="2266151" y="5135842"/>
               <a:ext cx="63202" cy="63202"/>
             </a:xfrm>
             <a:custGeom>
@@ -2918,7 +2918,7 @@
           </p:nvSpPr>
           <p:spPr>
             <a:xfrm>
-              <a:off x="1652936" y="4146867"/>
+              <a:off x="1553174" y="4146745"/>
               <a:ext cx="63202" cy="63202"/>
             </a:xfrm>
             <a:custGeom>
@@ -2961,7 +2961,7 @@
           </p:nvSpPr>
           <p:spPr>
             <a:xfrm>
-              <a:off x="1735448" y="2964302"/>
+              <a:off x="1639473" y="2964433"/>
               <a:ext cx="63202" cy="63202"/>
             </a:xfrm>
             <a:custGeom>
@@ -3004,7 +3004,7 @@
           </p:nvSpPr>
           <p:spPr>
             <a:xfrm>
-              <a:off x="2686711" y="6396319"/>
+              <a:off x="2917877" y="6396564"/>
               <a:ext cx="63202" cy="63202"/>
             </a:xfrm>
             <a:custGeom>
@@ -3047,7 +3047,7 @@
           </p:nvSpPr>
           <p:spPr>
             <a:xfrm>
-              <a:off x="1701072" y="2964298"/>
+              <a:off x="1893906" y="2964290"/>
               <a:ext cx="63202" cy="63202"/>
             </a:xfrm>
             <a:custGeom>
@@ -3090,7 +3090,7 @@
           </p:nvSpPr>
           <p:spPr>
             <a:xfrm>
-              <a:off x="2420170" y="5831606"/>
+              <a:off x="2082844" y="5831968"/>
               <a:ext cx="63202" cy="63202"/>
             </a:xfrm>
             <a:custGeom>
@@ -3133,7 +3133,7 @@
           </p:nvSpPr>
           <p:spPr>
             <a:xfrm>
-              <a:off x="1545816" y="4526224"/>
+              <a:off x="1861977" y="4526510"/>
               <a:ext cx="63202" cy="63202"/>
             </a:xfrm>
             <a:custGeom>
@@ -3176,7 +3176,7 @@
           </p:nvSpPr>
           <p:spPr>
             <a:xfrm>
-              <a:off x="1774871" y="3983908"/>
+              <a:off x="1557135" y="3983791"/>
               <a:ext cx="63202" cy="63202"/>
             </a:xfrm>
             <a:custGeom>
@@ -3219,7 +3219,7 @@
           </p:nvSpPr>
           <p:spPr>
             <a:xfrm>
-              <a:off x="2402318" y="5677729"/>
+              <a:off x="2326623" y="5677671"/>
               <a:ext cx="63202" cy="63202"/>
             </a:xfrm>
             <a:custGeom>
@@ -3262,7 +3262,7 @@
           </p:nvSpPr>
           <p:spPr>
             <a:xfrm>
-              <a:off x="2746082" y="5713665"/>
+              <a:off x="2974618" y="5714047"/>
               <a:ext cx="63202" cy="63202"/>
             </a:xfrm>
             <a:custGeom>
@@ -3305,7 +3305,7 @@
           </p:nvSpPr>
           <p:spPr>
             <a:xfrm>
-              <a:off x="1918712" y="3025008"/>
+              <a:off x="1677403" y="3025119"/>
               <a:ext cx="63202" cy="63202"/>
             </a:xfrm>
             <a:custGeom>
@@ -3348,7 +3348,7 @@
           </p:nvSpPr>
           <p:spPr>
             <a:xfrm>
-              <a:off x="1720519" y="3005984"/>
+              <a:off x="1733924" y="3006246"/>
               <a:ext cx="63202" cy="63202"/>
             </a:xfrm>
             <a:custGeom>
@@ -3391,7 +3391,7 @@
           </p:nvSpPr>
           <p:spPr>
             <a:xfrm>
-              <a:off x="1544841" y="2995774"/>
+              <a:off x="1794500" y="2996023"/>
               <a:ext cx="63202" cy="63202"/>
             </a:xfrm>
             <a:custGeom>
@@ -3434,7 +3434,7 @@
           </p:nvSpPr>
           <p:spPr>
             <a:xfrm>
-              <a:off x="1659373" y="4241336"/>
+              <a:off x="1575107" y="4241444"/>
               <a:ext cx="63202" cy="63202"/>
             </a:xfrm>
             <a:custGeom>
@@ -3533,7 +3533,7 @@
           </p:nvSpPr>
           <p:spPr>
             <a:xfrm>
-              <a:off x="3179228" y="6460539"/>
+              <a:off x="3179228" y="6460634"/>
               <a:ext cx="1650203" cy="0"/>
             </a:xfrm>
             <a:custGeom>
@@ -3576,7 +3576,7 @@
           </p:nvSpPr>
           <p:spPr>
             <a:xfrm>
-              <a:off x="3179228" y="5068390"/>
+              <a:off x="3179228" y="5068467"/>
               <a:ext cx="1650203" cy="0"/>
             </a:xfrm>
             <a:custGeom>
@@ -3619,7 +3619,7 @@
           </p:nvSpPr>
           <p:spPr>
             <a:xfrm>
-              <a:off x="3179228" y="3676241"/>
+              <a:off x="3179228" y="3676301"/>
               <a:ext cx="1650203" cy="0"/>
             </a:xfrm>
             <a:custGeom>
@@ -3662,7 +3662,7 @@
           </p:nvSpPr>
           <p:spPr>
             <a:xfrm>
-              <a:off x="3179228" y="2284092"/>
+              <a:off x="3179228" y="2284134"/>
               <a:ext cx="1650203" cy="0"/>
             </a:xfrm>
             <a:custGeom>
@@ -3705,7 +3705,7 @@
           </p:nvSpPr>
           <p:spPr>
             <a:xfrm>
-              <a:off x="3179228" y="5764465"/>
+              <a:off x="3179228" y="5764551"/>
               <a:ext cx="1650203" cy="0"/>
             </a:xfrm>
             <a:custGeom>
@@ -3748,7 +3748,7 @@
           </p:nvSpPr>
           <p:spPr>
             <a:xfrm>
-              <a:off x="3179228" y="4372316"/>
+              <a:off x="3179228" y="4372384"/>
               <a:ext cx="1650203" cy="0"/>
             </a:xfrm>
             <a:custGeom>
@@ -3791,7 +3791,7 @@
           </p:nvSpPr>
           <p:spPr>
             <a:xfrm>
-              <a:off x="3179228" y="2980167"/>
+              <a:off x="3179228" y="2980217"/>
               <a:ext cx="1650203" cy="0"/>
             </a:xfrm>
             <a:custGeom>
@@ -3834,7 +3834,7 @@
           </p:nvSpPr>
           <p:spPr>
             <a:xfrm>
-              <a:off x="3179228" y="1588018"/>
+              <a:off x="3179228" y="1588050"/>
               <a:ext cx="1650203" cy="0"/>
             </a:xfrm>
             <a:custGeom>
@@ -4006,7 +4006,7 @@
           </p:nvSpPr>
           <p:spPr>
             <a:xfrm>
-              <a:off x="3325984" y="3633016"/>
+              <a:off x="3407169" y="3633097"/>
               <a:ext cx="63202" cy="63202"/>
             </a:xfrm>
             <a:custGeom>
@@ -4049,7 +4049,7 @@
           </p:nvSpPr>
           <p:spPr>
             <a:xfrm>
-              <a:off x="3367543" y="3361147"/>
+              <a:off x="3365836" y="3361214"/>
               <a:ext cx="63202" cy="63202"/>
             </a:xfrm>
             <a:custGeom>
@@ -4092,7 +4092,7 @@
           </p:nvSpPr>
           <p:spPr>
             <a:xfrm>
-              <a:off x="3506030" y="3771634"/>
+              <a:off x="3642396" y="3771887"/>
               <a:ext cx="63202" cy="63202"/>
             </a:xfrm>
             <a:custGeom>
@@ -4135,7 +4135,7 @@
           </p:nvSpPr>
           <p:spPr>
             <a:xfrm>
-              <a:off x="3553915" y="3505425"/>
+              <a:off x="3329477" y="3505359"/>
               <a:ext cx="63202" cy="63202"/>
             </a:xfrm>
             <a:custGeom>
@@ -4178,7 +4178,7 @@
           </p:nvSpPr>
           <p:spPr>
             <a:xfrm>
-              <a:off x="3868859" y="5733212"/>
+              <a:off x="3846043" y="5733278"/>
               <a:ext cx="63202" cy="63202"/>
             </a:xfrm>
             <a:custGeom>
@@ -4221,7 +4221,7 @@
           </p:nvSpPr>
           <p:spPr>
             <a:xfrm>
-              <a:off x="3367309" y="4496507"/>
+              <a:off x="3323883" y="4496877"/>
               <a:ext cx="63202" cy="63202"/>
             </a:xfrm>
             <a:custGeom>
@@ -4264,7 +4264,7 @@
           </p:nvSpPr>
           <p:spPr>
             <a:xfrm>
-              <a:off x="3473683" y="3631947"/>
+              <a:off x="3436806" y="3632164"/>
               <a:ext cx="63202" cy="63202"/>
             </a:xfrm>
             <a:custGeom>
@@ -4307,7 +4307,7 @@
           </p:nvSpPr>
           <p:spPr>
             <a:xfrm>
-              <a:off x="3503459" y="3501842"/>
+              <a:off x="3652183" y="3501789"/>
               <a:ext cx="63202" cy="63202"/>
             </a:xfrm>
             <a:custGeom>
@@ -4350,7 +4350,7 @@
           </p:nvSpPr>
           <p:spPr>
             <a:xfrm>
-              <a:off x="3300086" y="3596664"/>
+              <a:off x="3356590" y="3597060"/>
               <a:ext cx="63202" cy="63202"/>
             </a:xfrm>
             <a:custGeom>
@@ -4393,7 +4393,7 @@
           </p:nvSpPr>
           <p:spPr>
             <a:xfrm>
-              <a:off x="3660354" y="4457613"/>
+              <a:off x="3552363" y="4457791"/>
               <a:ext cx="63202" cy="63202"/>
             </a:xfrm>
             <a:custGeom>
@@ -4436,7 +4436,7 @@
           </p:nvSpPr>
           <p:spPr>
             <a:xfrm>
-              <a:off x="3767222" y="6021503"/>
+              <a:off x="3894762" y="6021731"/>
               <a:ext cx="63202" cy="63202"/>
             </a:xfrm>
             <a:custGeom>
@@ -4479,7 +4479,7 @@
           </p:nvSpPr>
           <p:spPr>
             <a:xfrm>
-              <a:off x="3658006" y="4361627"/>
+              <a:off x="3386545" y="4361539"/>
               <a:ext cx="63202" cy="63202"/>
             </a:xfrm>
             <a:custGeom>
@@ -4522,7 +4522,7 @@
           </p:nvSpPr>
           <p:spPr>
             <a:xfrm>
-              <a:off x="3556659" y="4503035"/>
+              <a:off x="3316836" y="4503067"/>
               <a:ext cx="63202" cy="63202"/>
             </a:xfrm>
             <a:custGeom>
@@ -4565,7 +4565,7 @@
           </p:nvSpPr>
           <p:spPr>
             <a:xfrm>
-              <a:off x="3436160" y="4738106"/>
+              <a:off x="3415121" y="4738106"/>
               <a:ext cx="63202" cy="63202"/>
             </a:xfrm>
             <a:custGeom>
@@ -4608,7 +4608,7 @@
           </p:nvSpPr>
           <p:spPr>
             <a:xfrm>
-              <a:off x="3453067" y="4350845"/>
+              <a:off x="3417321" y="4351135"/>
               <a:ext cx="63202" cy="63202"/>
             </a:xfrm>
             <a:custGeom>
@@ -4651,7 +4651,7 @@
           </p:nvSpPr>
           <p:spPr>
             <a:xfrm>
-              <a:off x="3305634" y="3768403"/>
+              <a:off x="3351062" y="3768487"/>
               <a:ext cx="63202" cy="63202"/>
             </a:xfrm>
             <a:custGeom>
@@ -4694,7 +4694,7 @@
           </p:nvSpPr>
           <p:spPr>
             <a:xfrm>
-              <a:off x="4446160" y="6634049"/>
+              <a:off x="4620448" y="6634049"/>
               <a:ext cx="63202" cy="63202"/>
             </a:xfrm>
             <a:custGeom>
@@ -4737,7 +4737,7 @@
           </p:nvSpPr>
           <p:spPr>
             <a:xfrm>
-              <a:off x="3530522" y="4139198"/>
+              <a:off x="3407247" y="4139215"/>
               <a:ext cx="63202" cy="63202"/>
             </a:xfrm>
             <a:custGeom>
@@ -4780,7 +4780,7 @@
           </p:nvSpPr>
           <p:spPr>
             <a:xfrm>
-              <a:off x="3516707" y="3986785"/>
+              <a:off x="3566174" y="3986774"/>
               <a:ext cx="63202" cy="63202"/>
             </a:xfrm>
             <a:custGeom>
@@ -4823,7 +4823,7 @@
           </p:nvSpPr>
           <p:spPr>
             <a:xfrm>
-              <a:off x="3252359" y="3632937"/>
+              <a:off x="3281592" y="3633043"/>
               <a:ext cx="63202" cy="63202"/>
             </a:xfrm>
             <a:custGeom>
@@ -4866,7 +4866,7 @@
           </p:nvSpPr>
           <p:spPr>
             <a:xfrm>
-              <a:off x="3534329" y="5526322"/>
+              <a:off x="3383857" y="5526366"/>
               <a:ext cx="63202" cy="63202"/>
             </a:xfrm>
             <a:custGeom>
@@ -4909,7 +4909,7 @@
           </p:nvSpPr>
           <p:spPr>
             <a:xfrm>
-              <a:off x="3577676" y="4301267"/>
+              <a:off x="3602584" y="4301440"/>
               <a:ext cx="63202" cy="63202"/>
             </a:xfrm>
             <a:custGeom>
@@ -4952,7 +4952,7 @@
           </p:nvSpPr>
           <p:spPr>
             <a:xfrm>
-              <a:off x="3480835" y="4503279"/>
+              <a:off x="3318828" y="4503195"/>
               <a:ext cx="63202" cy="63202"/>
             </a:xfrm>
             <a:custGeom>
@@ -4995,7 +4995,7 @@
           </p:nvSpPr>
           <p:spPr>
             <a:xfrm>
-              <a:off x="3386085" y="5377030"/>
+              <a:off x="3446766" y="5376997"/>
               <a:ext cx="63202" cy="63202"/>
             </a:xfrm>
             <a:custGeom>
@@ -5038,7 +5038,7 @@
           </p:nvSpPr>
           <p:spPr>
             <a:xfrm>
-              <a:off x="3343244" y="3633090"/>
+              <a:off x="3596453" y="3632983"/>
               <a:ext cx="63202" cy="63202"/>
             </a:xfrm>
             <a:custGeom>
@@ -5081,7 +5081,7 @@
           </p:nvSpPr>
           <p:spPr>
             <a:xfrm>
-              <a:off x="3449983" y="4356081"/>
+              <a:off x="3562422" y="4356102"/>
               <a:ext cx="63202" cy="63202"/>
             </a:xfrm>
             <a:custGeom>
@@ -5124,7 +5124,7 @@
           </p:nvSpPr>
           <p:spPr>
             <a:xfrm>
-              <a:off x="3295340" y="4326512"/>
+              <a:off x="3499797" y="4326542"/>
               <a:ext cx="63202" cy="63202"/>
             </a:xfrm>
             <a:custGeom>
@@ -5167,7 +5167,7 @@
           </p:nvSpPr>
           <p:spPr>
             <a:xfrm>
-              <a:off x="3423246" y="5166596"/>
+              <a:off x="3572903" y="5166675"/>
               <a:ext cx="63202" cy="63202"/>
             </a:xfrm>
             <a:custGeom>
@@ -5210,7 +5210,7 @@
           </p:nvSpPr>
           <p:spPr>
             <a:xfrm>
-              <a:off x="3255882" y="3674503"/>
+              <a:off x="3574137" y="3674277"/>
               <a:ext cx="63202" cy="63202"/>
             </a:xfrm>
             <a:custGeom>
@@ -5253,7 +5253,7 @@
           </p:nvSpPr>
           <p:spPr>
             <a:xfrm>
-              <a:off x="3297835" y="3802788"/>
+              <a:off x="3602547" y="3803051"/>
               <a:ext cx="63202" cy="63202"/>
             </a:xfrm>
             <a:custGeom>
@@ -5296,7 +5296,7 @@
           </p:nvSpPr>
           <p:spPr>
             <a:xfrm>
-              <a:off x="3581460" y="3798325"/>
+              <a:off x="3369990" y="3798303"/>
               <a:ext cx="63202" cy="63202"/>
             </a:xfrm>
             <a:custGeom>
@@ -5339,7 +5339,7 @@
           </p:nvSpPr>
           <p:spPr>
             <a:xfrm>
-              <a:off x="3279166" y="3777206"/>
+              <a:off x="3618860" y="3777562"/>
               <a:ext cx="63202" cy="63202"/>
             </a:xfrm>
             <a:custGeom>
@@ -5382,7 +5382,7 @@
           </p:nvSpPr>
           <p:spPr>
             <a:xfrm>
-              <a:off x="3302445" y="3778729"/>
+              <a:off x="3269829" y="3778839"/>
               <a:ext cx="63202" cy="63202"/>
             </a:xfrm>
             <a:custGeom>
@@ -5425,7 +5425,7 @@
           </p:nvSpPr>
           <p:spPr>
             <a:xfrm>
-              <a:off x="3639034" y="3813450"/>
+              <a:off x="3474605" y="3813541"/>
               <a:ext cx="63202" cy="63202"/>
             </a:xfrm>
             <a:custGeom>
@@ -5468,7 +5468,7 @@
           </p:nvSpPr>
           <p:spPr>
             <a:xfrm>
-              <a:off x="3582525" y="3901208"/>
+              <a:off x="3328962" y="3901146"/>
               <a:ext cx="63202" cy="63202"/>
             </a:xfrm>
             <a:custGeom>
@@ -5511,7 +5511,7 @@
           </p:nvSpPr>
           <p:spPr>
             <a:xfrm>
-              <a:off x="3621442" y="4273607"/>
+              <a:off x="3581401" y="4273648"/>
               <a:ext cx="63202" cy="63202"/>
             </a:xfrm>
             <a:custGeom>
@@ -5554,7 +5554,7 @@
           </p:nvSpPr>
           <p:spPr>
             <a:xfrm>
-              <a:off x="3299828" y="4254933"/>
+              <a:off x="3263071" y="4255109"/>
               <a:ext cx="63202" cy="63202"/>
             </a:xfrm>
             <a:custGeom>
@@ -5597,7 +5597,7 @@
           </p:nvSpPr>
           <p:spPr>
             <a:xfrm>
-              <a:off x="3384389" y="3771646"/>
+              <a:off x="3463822" y="3771703"/>
               <a:ext cx="63202" cy="63202"/>
             </a:xfrm>
             <a:custGeom>
@@ -5640,7 +5640,7 @@
           </p:nvSpPr>
           <p:spPr>
             <a:xfrm>
-              <a:off x="3501964" y="4860122"/>
+              <a:off x="3363657" y="4860157"/>
               <a:ext cx="63202" cy="63202"/>
             </a:xfrm>
             <a:custGeom>
@@ -5683,7 +5683,7 @@
           </p:nvSpPr>
           <p:spPr>
             <a:xfrm>
-              <a:off x="3630582" y="4369858"/>
+              <a:off x="3436087" y="4369917"/>
               <a:ext cx="63202" cy="63202"/>
             </a:xfrm>
             <a:custGeom>
@@ -5726,7 +5726,7 @@
           </p:nvSpPr>
           <p:spPr>
             <a:xfrm>
-              <a:off x="3316741" y="3776459"/>
+              <a:off x="3599106" y="3776617"/>
               <a:ext cx="63202" cy="63202"/>
             </a:xfrm>
             <a:custGeom>
@@ -5769,7 +5769,7 @@
           </p:nvSpPr>
           <p:spPr>
             <a:xfrm>
-              <a:off x="3571202" y="3776535"/>
+              <a:off x="3308484" y="3776335"/>
               <a:ext cx="63202" cy="63202"/>
             </a:xfrm>
             <a:custGeom>
@@ -5812,7 +5812,7 @@
           </p:nvSpPr>
           <p:spPr>
             <a:xfrm>
-              <a:off x="3458375" y="3750927"/>
+              <a:off x="3601708" y="3750990"/>
               <a:ext cx="63202" cy="63202"/>
             </a:xfrm>
             <a:custGeom>
@@ -5855,7 +5855,7 @@
           </p:nvSpPr>
           <p:spPr>
             <a:xfrm>
-              <a:off x="3637422" y="3796829"/>
+              <a:off x="3560405" y="3796850"/>
               <a:ext cx="63202" cy="63202"/>
             </a:xfrm>
             <a:custGeom>
@@ -5898,7 +5898,7 @@
           </p:nvSpPr>
           <p:spPr>
             <a:xfrm>
-              <a:off x="3626840" y="3505330"/>
+              <a:off x="3345406" y="3505520"/>
               <a:ext cx="63202" cy="63202"/>
             </a:xfrm>
             <a:custGeom>
@@ -5997,7 +5997,7 @@
           </p:nvSpPr>
           <p:spPr>
             <a:xfrm>
-              <a:off x="4899021" y="6460539"/>
+              <a:off x="4899021" y="6460634"/>
               <a:ext cx="1650203" cy="0"/>
             </a:xfrm>
             <a:custGeom>
@@ -6040,7 +6040,7 @@
           </p:nvSpPr>
           <p:spPr>
             <a:xfrm>
-              <a:off x="4899021" y="5068390"/>
+              <a:off x="4899021" y="5068467"/>
               <a:ext cx="1650203" cy="0"/>
             </a:xfrm>
             <a:custGeom>
@@ -6083,7 +6083,7 @@
           </p:nvSpPr>
           <p:spPr>
             <a:xfrm>
-              <a:off x="4899021" y="3676241"/>
+              <a:off x="4899021" y="3676301"/>
               <a:ext cx="1650203" cy="0"/>
             </a:xfrm>
             <a:custGeom>
@@ -6126,7 +6126,7 @@
           </p:nvSpPr>
           <p:spPr>
             <a:xfrm>
-              <a:off x="4899021" y="2284092"/>
+              <a:off x="4899021" y="2284134"/>
               <a:ext cx="1650203" cy="0"/>
             </a:xfrm>
             <a:custGeom>
@@ -6169,7 +6169,7 @@
           </p:nvSpPr>
           <p:spPr>
             <a:xfrm>
-              <a:off x="4899021" y="5764465"/>
+              <a:off x="4899021" y="5764551"/>
               <a:ext cx="1650203" cy="0"/>
             </a:xfrm>
             <a:custGeom>
@@ -6212,7 +6212,7 @@
           </p:nvSpPr>
           <p:spPr>
             <a:xfrm>
-              <a:off x="4899021" y="4372316"/>
+              <a:off x="4899021" y="4372384"/>
               <a:ext cx="1650203" cy="0"/>
             </a:xfrm>
             <a:custGeom>
@@ -6255,7 +6255,7 @@
           </p:nvSpPr>
           <p:spPr>
             <a:xfrm>
-              <a:off x="4899021" y="2980167"/>
+              <a:off x="4899021" y="2980217"/>
               <a:ext cx="1650203" cy="0"/>
             </a:xfrm>
             <a:custGeom>
@@ -6298,7 +6298,7 @@
           </p:nvSpPr>
           <p:spPr>
             <a:xfrm>
-              <a:off x="4899021" y="1588018"/>
+              <a:off x="4899021" y="1588050"/>
               <a:ext cx="1650203" cy="0"/>
             </a:xfrm>
             <a:custGeom>
@@ -6470,7 +6470,7 @@
           </p:nvSpPr>
           <p:spPr>
             <a:xfrm>
-              <a:off x="5891202" y="5481485"/>
+              <a:off x="5890606" y="5481368"/>
               <a:ext cx="63202" cy="63202"/>
             </a:xfrm>
             <a:custGeom>
@@ -6513,7 +6513,7 @@
           </p:nvSpPr>
           <p:spPr>
             <a:xfrm>
-              <a:off x="5108752" y="1641734"/>
+              <a:off x="5158597" y="1641734"/>
               <a:ext cx="63202" cy="63202"/>
             </a:xfrm>
             <a:custGeom>
@@ -6556,7 +6556,7 @@
           </p:nvSpPr>
           <p:spPr>
             <a:xfrm>
-              <a:off x="5043884" y="2598711"/>
+              <a:off x="5158258" y="2598725"/>
               <a:ext cx="63202" cy="63202"/>
             </a:xfrm>
             <a:custGeom>
@@ -6599,7 +6599,7 @@
           </p:nvSpPr>
           <p:spPr>
             <a:xfrm>
-              <a:off x="5029779" y="2177797"/>
+              <a:off x="4975138" y="2177870"/>
               <a:ext cx="63202" cy="63202"/>
             </a:xfrm>
             <a:custGeom>
@@ -6642,7 +6642,7 @@
           </p:nvSpPr>
           <p:spPr>
             <a:xfrm>
-              <a:off x="5369068" y="2614734"/>
+              <a:off x="5261568" y="2614856"/>
               <a:ext cx="63202" cy="63202"/>
             </a:xfrm>
             <a:custGeom>
@@ -6685,7 +6685,7 @@
           </p:nvSpPr>
           <p:spPr>
             <a:xfrm>
-              <a:off x="5837025" y="5713708"/>
+              <a:off x="5625682" y="5713765"/>
               <a:ext cx="63202" cy="63202"/>
             </a:xfrm>
             <a:custGeom>
@@ -6728,7 +6728,7 @@
           </p:nvSpPr>
           <p:spPr>
             <a:xfrm>
-              <a:off x="6004537" y="6586186"/>
+              <a:off x="6065931" y="6586302"/>
               <a:ext cx="63202" cy="63202"/>
             </a:xfrm>
             <a:custGeom>
@@ -6771,7 +6771,7 @@
           </p:nvSpPr>
           <p:spPr>
             <a:xfrm>
-              <a:off x="5338795" y="5618990"/>
+              <a:off x="5166469" y="5619287"/>
               <a:ext cx="63202" cy="63202"/>
             </a:xfrm>
             <a:custGeom>
@@ -6814,7 +6814,7 @@
           </p:nvSpPr>
           <p:spPr>
             <a:xfrm>
-              <a:off x="5354918" y="4827624"/>
+              <a:off x="5135693" y="4827488"/>
               <a:ext cx="63202" cy="63202"/>
             </a:xfrm>
             <a:custGeom>
@@ -6857,7 +6857,7 @@
           </p:nvSpPr>
           <p:spPr>
             <a:xfrm>
-              <a:off x="5789590" y="5736513"/>
+              <a:off x="5628782" y="5736781"/>
               <a:ext cx="63202" cy="63202"/>
             </a:xfrm>
             <a:custGeom>
@@ -6900,7 +6900,7 @@
           </p:nvSpPr>
           <p:spPr>
             <a:xfrm>
-              <a:off x="5047079" y="3692559"/>
+              <a:off x="5028772" y="3692515"/>
               <a:ext cx="63202" cy="63202"/>
             </a:xfrm>
             <a:custGeom>
@@ -6943,7 +6943,7 @@
           </p:nvSpPr>
           <p:spPr>
             <a:xfrm>
-              <a:off x="5326740" y="3567170"/>
+              <a:off x="5097048" y="3567334"/>
               <a:ext cx="63202" cy="63202"/>
             </a:xfrm>
             <a:custGeom>
@@ -6986,7 +6986,7 @@
           </p:nvSpPr>
           <p:spPr>
             <a:xfrm>
-              <a:off x="6126357" y="6540436"/>
+              <a:off x="6234537" y="6540449"/>
               <a:ext cx="63202" cy="63202"/>
             </a:xfrm>
             <a:custGeom>
@@ -7029,7 +7029,7 @@
           </p:nvSpPr>
           <p:spPr>
             <a:xfrm>
-              <a:off x="5709406" y="5757830"/>
+              <a:off x="5505932" y="5757859"/>
               <a:ext cx="63202" cy="63202"/>
             </a:xfrm>
             <a:custGeom>
@@ -7072,7 +7072,7 @@
           </p:nvSpPr>
           <p:spPr>
             <a:xfrm>
-              <a:off x="5682532" y="5733162"/>
+              <a:off x="5649216" y="5733237"/>
               <a:ext cx="63202" cy="63202"/>
             </a:xfrm>
             <a:custGeom>
@@ -7171,7 +7171,7 @@
           </p:nvSpPr>
           <p:spPr>
             <a:xfrm>
-              <a:off x="6618814" y="6460539"/>
+              <a:off x="6618814" y="6460634"/>
               <a:ext cx="1650203" cy="0"/>
             </a:xfrm>
             <a:custGeom>
@@ -7214,7 +7214,7 @@
           </p:nvSpPr>
           <p:spPr>
             <a:xfrm>
-              <a:off x="6618814" y="5068390"/>
+              <a:off x="6618814" y="5068467"/>
               <a:ext cx="1650203" cy="0"/>
             </a:xfrm>
             <a:custGeom>
@@ -7257,7 +7257,7 @@
           </p:nvSpPr>
           <p:spPr>
             <a:xfrm>
-              <a:off x="6618814" y="3676241"/>
+              <a:off x="6618814" y="3676301"/>
               <a:ext cx="1650203" cy="0"/>
             </a:xfrm>
             <a:custGeom>
@@ -7300,7 +7300,7 @@
           </p:nvSpPr>
           <p:spPr>
             <a:xfrm>
-              <a:off x="6618814" y="2284092"/>
+              <a:off x="6618814" y="2284134"/>
               <a:ext cx="1650203" cy="0"/>
             </a:xfrm>
             <a:custGeom>
@@ -7343,7 +7343,7 @@
           </p:nvSpPr>
           <p:spPr>
             <a:xfrm>
-              <a:off x="6618814" y="5764465"/>
+              <a:off x="6618814" y="5764551"/>
               <a:ext cx="1650203" cy="0"/>
             </a:xfrm>
             <a:custGeom>
@@ -7386,7 +7386,7 @@
           </p:nvSpPr>
           <p:spPr>
             <a:xfrm>
-              <a:off x="6618814" y="4372316"/>
+              <a:off x="6618814" y="4372384"/>
               <a:ext cx="1650203" cy="0"/>
             </a:xfrm>
             <a:custGeom>
@@ -7429,7 +7429,7 @@
           </p:nvSpPr>
           <p:spPr>
             <a:xfrm>
-              <a:off x="6618814" y="2980167"/>
+              <a:off x="6618814" y="2980217"/>
               <a:ext cx="1650203" cy="0"/>
             </a:xfrm>
             <a:custGeom>
@@ -7472,7 +7472,7 @@
           </p:nvSpPr>
           <p:spPr>
             <a:xfrm>
-              <a:off x="6618814" y="1588018"/>
+              <a:off x="6618814" y="1588050"/>
               <a:ext cx="1650203" cy="0"/>
             </a:xfrm>
             <a:custGeom>
@@ -7644,7 +7644,7 @@
           </p:nvSpPr>
           <p:spPr>
             <a:xfrm>
-              <a:off x="7282776" y="5733264"/>
+              <a:off x="7535060" y="5733598"/>
               <a:ext cx="63202" cy="63202"/>
             </a:xfrm>
             <a:custGeom>
@@ -7687,7 +7687,7 @@
           </p:nvSpPr>
           <p:spPr>
             <a:xfrm>
-              <a:off x="6843904" y="5207102"/>
+              <a:off x="6867797" y="5207243"/>
               <a:ext cx="63202" cy="63202"/>
             </a:xfrm>
             <a:custGeom>
@@ -7730,7 +7730,7 @@
           </p:nvSpPr>
           <p:spPr>
             <a:xfrm>
-              <a:off x="6887015" y="4859106"/>
+              <a:off x="6969177" y="4859077"/>
               <a:ext cx="63202" cy="63202"/>
             </a:xfrm>
             <a:custGeom>
@@ -7773,7 +7773,7 @@
           </p:nvSpPr>
           <p:spPr>
             <a:xfrm>
-              <a:off x="7994725" y="6554154"/>
+              <a:off x="7803183" y="6554314"/>
               <a:ext cx="63202" cy="63202"/>
             </a:xfrm>
             <a:custGeom>
@@ -7872,7 +7872,7 @@
           </p:nvSpPr>
           <p:spPr>
             <a:xfrm>
-              <a:off x="8338607" y="6460539"/>
+              <a:off x="8338607" y="6460634"/>
               <a:ext cx="1650203" cy="0"/>
             </a:xfrm>
             <a:custGeom>
@@ -7915,7 +7915,7 @@
           </p:nvSpPr>
           <p:spPr>
             <a:xfrm>
-              <a:off x="8338607" y="5068390"/>
+              <a:off x="8338607" y="5068467"/>
               <a:ext cx="1650203" cy="0"/>
             </a:xfrm>
             <a:custGeom>
@@ -7958,7 +7958,7 @@
           </p:nvSpPr>
           <p:spPr>
             <a:xfrm>
-              <a:off x="8338607" y="3676241"/>
+              <a:off x="8338607" y="3676301"/>
               <a:ext cx="1650203" cy="0"/>
             </a:xfrm>
             <a:custGeom>
@@ -8001,7 +8001,7 @@
           </p:nvSpPr>
           <p:spPr>
             <a:xfrm>
-              <a:off x="8338607" y="2284092"/>
+              <a:off x="8338607" y="2284134"/>
               <a:ext cx="1650203" cy="0"/>
             </a:xfrm>
             <a:custGeom>
@@ -8044,7 +8044,7 @@
           </p:nvSpPr>
           <p:spPr>
             <a:xfrm>
-              <a:off x="8338607" y="5764465"/>
+              <a:off x="8338607" y="5764551"/>
               <a:ext cx="1650203" cy="0"/>
             </a:xfrm>
             <a:custGeom>
@@ -8087,7 +8087,7 @@
           </p:nvSpPr>
           <p:spPr>
             <a:xfrm>
-              <a:off x="8338607" y="4372316"/>
+              <a:off x="8338607" y="4372384"/>
               <a:ext cx="1650203" cy="0"/>
             </a:xfrm>
             <a:custGeom>
@@ -8130,7 +8130,7 @@
           </p:nvSpPr>
           <p:spPr>
             <a:xfrm>
-              <a:off x="8338607" y="2980167"/>
+              <a:off x="8338607" y="2980217"/>
               <a:ext cx="1650203" cy="0"/>
             </a:xfrm>
             <a:custGeom>
@@ -8173,7 +8173,7 @@
           </p:nvSpPr>
           <p:spPr>
             <a:xfrm>
-              <a:off x="8338607" y="1588018"/>
+              <a:off x="8338607" y="1588050"/>
               <a:ext cx="1650203" cy="0"/>
             </a:xfrm>
             <a:custGeom>
@@ -8345,7 +8345,7 @@
           </p:nvSpPr>
           <p:spPr>
             <a:xfrm>
-              <a:off x="8444438" y="2127167"/>
+              <a:off x="8741134" y="2127315"/>
               <a:ext cx="63202" cy="63202"/>
             </a:xfrm>
             <a:custGeom>
@@ -8388,7 +8388,7 @@
           </p:nvSpPr>
           <p:spPr>
             <a:xfrm>
-              <a:off x="8545787" y="2084527"/>
+              <a:off x="8769918" y="2084696"/>
               <a:ext cx="63202" cy="63202"/>
             </a:xfrm>
             <a:custGeom>
@@ -8431,7 +8431,7 @@
           </p:nvSpPr>
           <p:spPr>
             <a:xfrm>
-              <a:off x="8792822" y="2027301"/>
+              <a:off x="8441978" y="2027527"/>
               <a:ext cx="63202" cy="63202"/>
             </a:xfrm>
             <a:custGeom>
@@ -8474,7 +8474,7 @@
           </p:nvSpPr>
           <p:spPr>
             <a:xfrm>
-              <a:off x="8702350" y="4973622"/>
+              <a:off x="8579439" y="4973687"/>
               <a:ext cx="63202" cy="63202"/>
             </a:xfrm>
             <a:custGeom>
@@ -8517,7 +8517,7 @@
           </p:nvSpPr>
           <p:spPr>
             <a:xfrm>
-              <a:off x="8620284" y="4906501"/>
+              <a:off x="8663329" y="4906490"/>
               <a:ext cx="63202" cy="63202"/>
             </a:xfrm>
             <a:custGeom>
@@ -8560,7 +8560,7 @@
           </p:nvSpPr>
           <p:spPr>
             <a:xfrm>
-              <a:off x="9330494" y="5990257"/>
+              <a:off x="9281365" y="5990432"/>
               <a:ext cx="63202" cy="63202"/>
             </a:xfrm>
             <a:custGeom>
@@ -8603,7 +8603,7 @@
           </p:nvSpPr>
           <p:spPr>
             <a:xfrm>
-              <a:off x="9128311" y="6217730"/>
+              <a:off x="9303278" y="6217796"/>
               <a:ext cx="63202" cy="63202"/>
             </a:xfrm>
             <a:custGeom>
@@ -8646,7 +8646,7 @@
           </p:nvSpPr>
           <p:spPr>
             <a:xfrm>
-              <a:off x="8778289" y="4263752"/>
+              <a:off x="8621634" y="4263864"/>
               <a:ext cx="63202" cy="63202"/>
             </a:xfrm>
             <a:custGeom>
@@ -8689,7 +8689,7 @@
           </p:nvSpPr>
           <p:spPr>
             <a:xfrm>
-              <a:off x="8928122" y="5653124"/>
+              <a:off x="8944370" y="5653219"/>
               <a:ext cx="63202" cy="63202"/>
             </a:xfrm>
             <a:custGeom>
@@ -8732,7 +8732,7 @@
           </p:nvSpPr>
           <p:spPr>
             <a:xfrm>
-              <a:off x="8505338" y="4366144"/>
+              <a:off x="8536429" y="4366230"/>
               <a:ext cx="63202" cy="63202"/>
             </a:xfrm>
             <a:custGeom>
@@ -8775,7 +8775,7 @@
           </p:nvSpPr>
           <p:spPr>
             <a:xfrm>
-              <a:off x="8716474" y="4161276"/>
+              <a:off x="8609598" y="4161013"/>
               <a:ext cx="63202" cy="63202"/>
             </a:xfrm>
             <a:custGeom>
@@ -8818,7 +8818,7 @@
           </p:nvSpPr>
           <p:spPr>
             <a:xfrm>
-              <a:off x="8788847" y="4912467"/>
+              <a:off x="8451973" y="4912520"/>
               <a:ext cx="63202" cy="63202"/>
             </a:xfrm>
             <a:custGeom>
@@ -8861,7 +8861,7 @@
           </p:nvSpPr>
           <p:spPr>
             <a:xfrm>
-              <a:off x="8717251" y="4193717"/>
+              <a:off x="8730429" y="4193718"/>
               <a:ext cx="63202" cy="63202"/>
             </a:xfrm>
             <a:custGeom>
@@ -8904,7 +8904,7 @@
           </p:nvSpPr>
           <p:spPr>
             <a:xfrm>
-              <a:off x="8630067" y="4523880"/>
+              <a:off x="8745871" y="4523946"/>
               <a:ext cx="63202" cy="63202"/>
             </a:xfrm>
             <a:custGeom>
@@ -8947,7 +8947,7 @@
           </p:nvSpPr>
           <p:spPr>
             <a:xfrm>
-              <a:off x="9333207" y="6155555"/>
+              <a:off x="9234549" y="6155746"/>
               <a:ext cx="63202" cy="63202"/>
             </a:xfrm>
             <a:custGeom>
@@ -8990,7 +8990,7 @@
           </p:nvSpPr>
           <p:spPr>
             <a:xfrm>
-              <a:off x="9169368" y="6095373"/>
+              <a:off x="9235305" y="6095324"/>
               <a:ext cx="63202" cy="63202"/>
             </a:xfrm>
             <a:custGeom>
@@ -9033,7 +9033,7 @@
           </p:nvSpPr>
           <p:spPr>
             <a:xfrm>
-              <a:off x="8653028" y="4447559"/>
+              <a:off x="8704552" y="4447373"/>
               <a:ext cx="63202" cy="63202"/>
             </a:xfrm>
             <a:custGeom>
@@ -9076,7 +9076,7 @@
           </p:nvSpPr>
           <p:spPr>
             <a:xfrm>
-              <a:off x="9283916" y="5151787"/>
+              <a:off x="9256517" y="5151790"/>
               <a:ext cx="63202" cy="63202"/>
             </a:xfrm>
             <a:custGeom>
@@ -9119,7 +9119,7 @@
           </p:nvSpPr>
           <p:spPr>
             <a:xfrm>
-              <a:off x="8479382" y="2024046"/>
+              <a:off x="8820961" y="2024390"/>
               <a:ext cx="63202" cy="63202"/>
             </a:xfrm>
             <a:custGeom>
@@ -9162,7 +9162,7 @@
           </p:nvSpPr>
           <p:spPr>
             <a:xfrm>
-              <a:off x="8660146" y="5088159"/>
+              <a:off x="8589436" y="5088341"/>
               <a:ext cx="63202" cy="63202"/>
             </a:xfrm>
             <a:custGeom>
@@ -9205,7 +9205,7 @@
           </p:nvSpPr>
           <p:spPr>
             <a:xfrm>
-              <a:off x="8465099" y="4390809"/>
+              <a:off x="8786713" y="4390743"/>
               <a:ext cx="63202" cy="63202"/>
             </a:xfrm>
             <a:custGeom>
@@ -9248,7 +9248,7 @@
           </p:nvSpPr>
           <p:spPr>
             <a:xfrm>
-              <a:off x="9022316" y="5070525"/>
+              <a:off x="9316159" y="5070581"/>
               <a:ext cx="63202" cy="63202"/>
             </a:xfrm>
             <a:custGeom>
@@ -9291,7 +9291,7 @@
           </p:nvSpPr>
           <p:spPr>
             <a:xfrm>
-              <a:off x="8460072" y="5216668"/>
+              <a:off x="8634332" y="5216969"/>
               <a:ext cx="63202" cy="63202"/>
             </a:xfrm>
             <a:custGeom>
@@ -9334,7 +9334,7 @@
           </p:nvSpPr>
           <p:spPr>
             <a:xfrm>
-              <a:off x="8525281" y="5536702"/>
+              <a:off x="8602192" y="5536538"/>
               <a:ext cx="63202" cy="63202"/>
             </a:xfrm>
             <a:custGeom>
@@ -9377,7 +9377,7 @@
           </p:nvSpPr>
           <p:spPr>
             <a:xfrm>
-              <a:off x="8739709" y="3025952"/>
+              <a:off x="8547280" y="3025954"/>
               <a:ext cx="63202" cy="63202"/>
             </a:xfrm>
             <a:custGeom>
@@ -9420,7 +9420,7 @@
           </p:nvSpPr>
           <p:spPr>
             <a:xfrm>
-              <a:off x="8457708" y="4714154"/>
+              <a:off x="8505039" y="4714470"/>
               <a:ext cx="63202" cy="63202"/>
             </a:xfrm>
             <a:custGeom>
@@ -9463,7 +9463,7 @@
           </p:nvSpPr>
           <p:spPr>
             <a:xfrm>
-              <a:off x="8468849" y="1953986"/>
+              <a:off x="8817428" y="1953965"/>
               <a:ext cx="63202" cy="63202"/>
             </a:xfrm>
             <a:custGeom>
@@ -9506,7 +9506,7 @@
           </p:nvSpPr>
           <p:spPr>
             <a:xfrm>
-              <a:off x="8809793" y="1916229"/>
+              <a:off x="8737788" y="1916243"/>
               <a:ext cx="63202" cy="63202"/>
             </a:xfrm>
             <a:custGeom>
@@ -9549,7 +9549,7 @@
           </p:nvSpPr>
           <p:spPr>
             <a:xfrm>
-              <a:off x="8664455" y="4772411"/>
+              <a:off x="8551838" y="4772421"/>
               <a:ext cx="63202" cy="63202"/>
             </a:xfrm>
             <a:custGeom>
@@ -9592,7 +9592,7 @@
           </p:nvSpPr>
           <p:spPr>
             <a:xfrm>
-              <a:off x="8794894" y="4489758"/>
+              <a:off x="8624309" y="4489780"/>
               <a:ext cx="63202" cy="63202"/>
             </a:xfrm>
             <a:custGeom>
@@ -9635,7 +9635,7 @@
           </p:nvSpPr>
           <p:spPr>
             <a:xfrm>
-              <a:off x="8669498" y="1913787"/>
+              <a:off x="8439380" y="1913847"/>
               <a:ext cx="63202" cy="63202"/>
             </a:xfrm>
             <a:custGeom>
@@ -9678,7 +9678,7 @@
           </p:nvSpPr>
           <p:spPr>
             <a:xfrm>
-              <a:off x="9774054" y="6591245"/>
+              <a:off x="9827097" y="6591499"/>
               <a:ext cx="63202" cy="63202"/>
             </a:xfrm>
             <a:custGeom>
@@ -9721,7 +9721,7 @@
           </p:nvSpPr>
           <p:spPr>
             <a:xfrm>
-              <a:off x="8797453" y="4291673"/>
+              <a:off x="8613035" y="4291760"/>
               <a:ext cx="63202" cy="63202"/>
             </a:xfrm>
             <a:custGeom>
@@ -9764,7 +9764,7 @@
           </p:nvSpPr>
           <p:spPr>
             <a:xfrm>
-              <a:off x="8451091" y="3082068"/>
+              <a:off x="8536731" y="3082258"/>
               <a:ext cx="63202" cy="63202"/>
             </a:xfrm>
             <a:custGeom>
@@ -9807,7 +9807,7 @@
           </p:nvSpPr>
           <p:spPr>
             <a:xfrm>
-              <a:off x="8573840" y="3033823"/>
+              <a:off x="8492155" y="3034014"/>
               <a:ext cx="63202" cy="63202"/>
             </a:xfrm>
             <a:custGeom>
@@ -9850,7 +9850,7 @@
           </p:nvSpPr>
           <p:spPr>
             <a:xfrm>
-              <a:off x="8807827" y="2004813"/>
+              <a:off x="8773034" y="2004668"/>
               <a:ext cx="63202" cy="63202"/>
             </a:xfrm>
             <a:custGeom>
@@ -9893,7 +9893,7 @@
           </p:nvSpPr>
           <p:spPr>
             <a:xfrm>
-              <a:off x="8568014" y="1946131"/>
+              <a:off x="8807777" y="1946211"/>
               <a:ext cx="63202" cy="63202"/>
             </a:xfrm>
             <a:custGeom>
@@ -9936,7 +9936,7 @@
           </p:nvSpPr>
           <p:spPr>
             <a:xfrm>
-              <a:off x="8728070" y="2005236"/>
+              <a:off x="8642298" y="2005200"/>
               <a:ext cx="63202" cy="63202"/>
             </a:xfrm>
             <a:custGeom>
@@ -9979,7 +9979,7 @@
           </p:nvSpPr>
           <p:spPr>
             <a:xfrm>
-              <a:off x="8719237" y="2004764"/>
+              <a:off x="8600849" y="2004577"/>
               <a:ext cx="63202" cy="63202"/>
             </a:xfrm>
             <a:custGeom>
@@ -10022,7 +10022,7 @@
           </p:nvSpPr>
           <p:spPr>
             <a:xfrm>
-              <a:off x="8723500" y="1943942"/>
+              <a:off x="8778599" y="1943991"/>
               <a:ext cx="63202" cy="63202"/>
             </a:xfrm>
             <a:custGeom>
@@ -10065,7 +10065,7 @@
           </p:nvSpPr>
           <p:spPr>
             <a:xfrm>
-              <a:off x="8427014" y="3031313"/>
+              <a:off x="8475032" y="3031301"/>
               <a:ext cx="63202" cy="63202"/>
             </a:xfrm>
             <a:custGeom>
@@ -10108,7 +10108,7 @@
           </p:nvSpPr>
           <p:spPr>
             <a:xfrm>
-              <a:off x="8686113" y="3054838"/>
+              <a:off x="8626367" y="3054863"/>
               <a:ext cx="63202" cy="63202"/>
             </a:xfrm>
             <a:custGeom>
@@ -10151,7 +10151,7 @@
           </p:nvSpPr>
           <p:spPr>
             <a:xfrm>
-              <a:off x="8517503" y="5587290"/>
+              <a:off x="8604725" y="5587074"/>
               <a:ext cx="63202" cy="63202"/>
             </a:xfrm>
             <a:custGeom>
@@ -10194,7 +10194,7 @@
           </p:nvSpPr>
           <p:spPr>
             <a:xfrm>
-              <a:off x="8558988" y="2588074"/>
+              <a:off x="8819877" y="2588088"/>
               <a:ext cx="63202" cy="63202"/>
             </a:xfrm>
             <a:custGeom>
@@ -10237,7 +10237,7 @@
           </p:nvSpPr>
           <p:spPr>
             <a:xfrm>
-              <a:off x="8630275" y="2496913"/>
+              <a:off x="8543364" y="2497072"/>
               <a:ext cx="63202" cy="63202"/>
             </a:xfrm>
             <a:custGeom>
@@ -10280,7 +10280,7 @@
           </p:nvSpPr>
           <p:spPr>
             <a:xfrm>
-              <a:off x="8566464" y="2563399"/>
+              <a:off x="8627666" y="2563491"/>
               <a:ext cx="63202" cy="63202"/>
             </a:xfrm>
             <a:custGeom>
@@ -10323,7 +10323,7 @@
           </p:nvSpPr>
           <p:spPr>
             <a:xfrm>
-              <a:off x="8726783" y="5640155"/>
+              <a:off x="8751729" y="5640211"/>
               <a:ext cx="63202" cy="63202"/>
             </a:xfrm>
             <a:custGeom>
@@ -10366,7 +10366,7 @@
           </p:nvSpPr>
           <p:spPr>
             <a:xfrm>
-              <a:off x="8607166" y="2077363"/>
+              <a:off x="8660714" y="2077409"/>
               <a:ext cx="63202" cy="63202"/>
             </a:xfrm>
             <a:custGeom>
@@ -10409,7 +10409,7 @@
           </p:nvSpPr>
           <p:spPr>
             <a:xfrm>
-              <a:off x="8655288" y="2861880"/>
+              <a:off x="8583083" y="2861835"/>
               <a:ext cx="63202" cy="63202"/>
             </a:xfrm>
             <a:custGeom>
@@ -10452,7 +10452,7 @@
           </p:nvSpPr>
           <p:spPr>
             <a:xfrm>
-              <a:off x="8459502" y="2993537"/>
+              <a:off x="8592348" y="2993643"/>
               <a:ext cx="63202" cy="63202"/>
             </a:xfrm>
             <a:custGeom>
@@ -10495,7 +10495,7 @@
           </p:nvSpPr>
           <p:spPr>
             <a:xfrm>
-              <a:off x="8623461" y="1947076"/>
+              <a:off x="8518863" y="1947026"/>
               <a:ext cx="63202" cy="63202"/>
             </a:xfrm>
             <a:custGeom>
@@ -10538,7 +10538,7 @@
           </p:nvSpPr>
           <p:spPr>
             <a:xfrm>
-              <a:off x="8784250" y="1960467"/>
+              <a:off x="8475918" y="1960502"/>
               <a:ext cx="63202" cy="63202"/>
             </a:xfrm>
             <a:custGeom>
@@ -10581,7 +10581,7 @@
           </p:nvSpPr>
           <p:spPr>
             <a:xfrm>
-              <a:off x="8577481" y="2396470"/>
+              <a:off x="8767364" y="2396567"/>
               <a:ext cx="63202" cy="63202"/>
             </a:xfrm>
             <a:custGeom>
@@ -10624,7 +10624,7 @@
           </p:nvSpPr>
           <p:spPr>
             <a:xfrm>
-              <a:off x="8605633" y="2731876"/>
+              <a:off x="8797958" y="2731890"/>
               <a:ext cx="63202" cy="63202"/>
             </a:xfrm>
             <a:custGeom>
@@ -10667,7 +10667,7 @@
           </p:nvSpPr>
           <p:spPr>
             <a:xfrm>
-              <a:off x="8575001" y="2543030"/>
+              <a:off x="8531069" y="2543153"/>
               <a:ext cx="63202" cy="63202"/>
             </a:xfrm>
             <a:custGeom>
@@ -10710,7 +10710,7 @@
           </p:nvSpPr>
           <p:spPr>
             <a:xfrm>
-              <a:off x="8755001" y="1943954"/>
+              <a:off x="8464463" y="1943779"/>
               <a:ext cx="63202" cy="63202"/>
             </a:xfrm>
             <a:custGeom>
@@ -10753,7 +10753,7 @@
           </p:nvSpPr>
           <p:spPr>
             <a:xfrm>
-              <a:off x="8524536" y="1947614"/>
+              <a:off x="8701024" y="1947749"/>
               <a:ext cx="63202" cy="63202"/>
             </a:xfrm>
             <a:custGeom>
@@ -10796,7 +10796,7 @@
           </p:nvSpPr>
           <p:spPr>
             <a:xfrm>
-              <a:off x="8734262" y="3016830"/>
+              <a:off x="8782213" y="3016661"/>
               <a:ext cx="63202" cy="63202"/>
             </a:xfrm>
             <a:custGeom>
@@ -10839,7 +10839,7 @@
           </p:nvSpPr>
           <p:spPr>
             <a:xfrm>
-              <a:off x="8415929" y="1954199"/>
+              <a:off x="8540482" y="1954165"/>
               <a:ext cx="63202" cy="63202"/>
             </a:xfrm>
             <a:custGeom>
@@ -10882,7 +10882,7 @@
           </p:nvSpPr>
           <p:spPr>
             <a:xfrm>
-              <a:off x="8528525" y="1957286"/>
+              <a:off x="8506647" y="1957504"/>
               <a:ext cx="63202" cy="63202"/>
             </a:xfrm>
             <a:custGeom>
@@ -10925,7 +10925,7 @@
           </p:nvSpPr>
           <p:spPr>
             <a:xfrm>
-              <a:off x="8710145" y="1948026"/>
+              <a:off x="8433403" y="1948277"/>
               <a:ext cx="63202" cy="63202"/>
             </a:xfrm>
             <a:custGeom>
@@ -10968,7 +10968,7 @@
           </p:nvSpPr>
           <p:spPr>
             <a:xfrm>
-              <a:off x="8641607" y="1913837"/>
+              <a:off x="8647933" y="1913709"/>
               <a:ext cx="63202" cy="63202"/>
             </a:xfrm>
             <a:custGeom>
@@ -11011,7 +11011,7 @@
           </p:nvSpPr>
           <p:spPr>
             <a:xfrm>
-              <a:off x="8539229" y="1962472"/>
+              <a:off x="8603393" y="1962458"/>
               <a:ext cx="63202" cy="63202"/>
             </a:xfrm>
             <a:custGeom>
@@ -11054,7 +11054,7 @@
           </p:nvSpPr>
           <p:spPr>
             <a:xfrm>
-              <a:off x="8551053" y="3090041"/>
+              <a:off x="8652612" y="3090199"/>
               <a:ext cx="63202" cy="63202"/>
             </a:xfrm>
             <a:custGeom>
@@ -11097,7 +11097,7 @@
           </p:nvSpPr>
           <p:spPr>
             <a:xfrm>
-              <a:off x="8671952" y="1860788"/>
+              <a:off x="8716841" y="1861033"/>
               <a:ext cx="63202" cy="63202"/>
             </a:xfrm>
             <a:custGeom>
@@ -11140,7 +11140,7 @@
           </p:nvSpPr>
           <p:spPr>
             <a:xfrm>
-              <a:off x="8713031" y="2417788"/>
+              <a:off x="8640700" y="2417861"/>
               <a:ext cx="63202" cy="63202"/>
             </a:xfrm>
             <a:custGeom>
@@ -11183,7 +11183,7 @@
           </p:nvSpPr>
           <p:spPr>
             <a:xfrm>
-              <a:off x="8574969" y="4771051"/>
+              <a:off x="8468757" y="4770810"/>
               <a:ext cx="63202" cy="63202"/>
             </a:xfrm>
             <a:custGeom>
@@ -11226,7 +11226,7 @@
           </p:nvSpPr>
           <p:spPr>
             <a:xfrm>
-              <a:off x="8602612" y="4773187"/>
+              <a:off x="8528314" y="4773226"/>
               <a:ext cx="63202" cy="63202"/>
             </a:xfrm>
             <a:custGeom>
@@ -11269,7 +11269,7 @@
           </p:nvSpPr>
           <p:spPr>
             <a:xfrm>
-              <a:off x="8781345" y="2209024"/>
+              <a:off x="8805093" y="2208731"/>
               <a:ext cx="63202" cy="63202"/>
             </a:xfrm>
             <a:custGeom>
@@ -11312,7 +11312,7 @@
           </p:nvSpPr>
           <p:spPr>
             <a:xfrm>
-              <a:off x="8542009" y="2439672"/>
+              <a:off x="8448222" y="2439525"/>
               <a:ext cx="63202" cy="63202"/>
             </a:xfrm>
             <a:custGeom>
@@ -11355,7 +11355,7 @@
           </p:nvSpPr>
           <p:spPr>
             <a:xfrm>
-              <a:off x="8689309" y="4912367"/>
+              <a:off x="8521310" y="4912380"/>
               <a:ext cx="63202" cy="63202"/>
             </a:xfrm>
             <a:custGeom>
@@ -11398,7 +11398,7 @@
           </p:nvSpPr>
           <p:spPr>
             <a:xfrm>
-              <a:off x="8752743" y="4903117"/>
+              <a:off x="8565793" y="4903131"/>
               <a:ext cx="63202" cy="63202"/>
             </a:xfrm>
             <a:custGeom>
@@ -11441,7 +11441,7 @@
           </p:nvSpPr>
           <p:spPr>
             <a:xfrm>
-              <a:off x="8636824" y="4909219"/>
+              <a:off x="8483497" y="4909140"/>
               <a:ext cx="63202" cy="63202"/>
             </a:xfrm>
             <a:custGeom>
@@ -11484,7 +11484,7 @@
           </p:nvSpPr>
           <p:spPr>
             <a:xfrm>
-              <a:off x="8722691" y="4737341"/>
+              <a:off x="8584039" y="4737536"/>
               <a:ext cx="63202" cy="63202"/>
             </a:xfrm>
             <a:custGeom>
@@ -11527,7 +11527,7 @@
           </p:nvSpPr>
           <p:spPr>
             <a:xfrm>
-              <a:off x="8481442" y="1937005"/>
+              <a:off x="8508127" y="1937066"/>
               <a:ext cx="63202" cy="63202"/>
             </a:xfrm>
             <a:custGeom>
@@ -11570,7 +11570,7 @@
           </p:nvSpPr>
           <p:spPr>
             <a:xfrm>
-              <a:off x="8440151" y="5541346"/>
+              <a:off x="8731981" y="5541115"/>
               <a:ext cx="63202" cy="63202"/>
             </a:xfrm>
             <a:custGeom>
@@ -11613,7 +11613,7 @@
           </p:nvSpPr>
           <p:spPr>
             <a:xfrm>
-              <a:off x="8759700" y="5660103"/>
+              <a:off x="8715087" y="5660087"/>
               <a:ext cx="63202" cy="63202"/>
             </a:xfrm>
             <a:custGeom>
@@ -11656,7 +11656,7 @@
           </p:nvSpPr>
           <p:spPr>
             <a:xfrm>
-              <a:off x="8812855" y="5710705"/>
+              <a:off x="8648605" y="5710681"/>
               <a:ext cx="63202" cy="63202"/>
             </a:xfrm>
             <a:custGeom>
@@ -11699,7 +11699,7 @@
           </p:nvSpPr>
           <p:spPr>
             <a:xfrm>
-              <a:off x="8692878" y="5689565"/>
+              <a:off x="8699075" y="5689689"/>
               <a:ext cx="63202" cy="63202"/>
             </a:xfrm>
             <a:custGeom>
@@ -11742,7 +11742,7 @@
           </p:nvSpPr>
           <p:spPr>
             <a:xfrm>
-              <a:off x="8564146" y="5659931"/>
+              <a:off x="8711320" y="5660149"/>
               <a:ext cx="63202" cy="63202"/>
             </a:xfrm>
             <a:custGeom>
@@ -11785,7 +11785,7 @@
           </p:nvSpPr>
           <p:spPr>
             <a:xfrm>
-              <a:off x="8550124" y="2101839"/>
+              <a:off x="8541278" y="2101712"/>
               <a:ext cx="63202" cy="63202"/>
             </a:xfrm>
             <a:custGeom>
@@ -11828,7 +11828,7 @@
           </p:nvSpPr>
           <p:spPr>
             <a:xfrm>
-              <a:off x="8727623" y="4408349"/>
+              <a:off x="8446239" y="4408556"/>
               <a:ext cx="63202" cy="63202"/>
             </a:xfrm>
             <a:custGeom>
@@ -11871,7 +11871,7 @@
           </p:nvSpPr>
           <p:spPr>
             <a:xfrm>
-              <a:off x="8659219" y="2072969"/>
+              <a:off x="8779628" y="2073081"/>
               <a:ext cx="63202" cy="63202"/>
             </a:xfrm>
             <a:custGeom>
@@ -11914,7 +11914,7 @@
           </p:nvSpPr>
           <p:spPr>
             <a:xfrm>
-              <a:off x="8679530" y="2099936"/>
+              <a:off x="8577595" y="2099743"/>
               <a:ext cx="63202" cy="63202"/>
             </a:xfrm>
             <a:custGeom>
@@ -11957,7 +11957,7 @@
           </p:nvSpPr>
           <p:spPr>
             <a:xfrm>
-              <a:off x="8643873" y="2012739"/>
+              <a:off x="8457301" y="2012769"/>
               <a:ext cx="63202" cy="63202"/>
             </a:xfrm>
             <a:custGeom>
@@ -12000,7 +12000,7 @@
           </p:nvSpPr>
           <p:spPr>
             <a:xfrm>
-              <a:off x="8611441" y="2038846"/>
+              <a:off x="8722948" y="2039234"/>
               <a:ext cx="63202" cy="63202"/>
             </a:xfrm>
             <a:custGeom>
@@ -12043,7 +12043,7 @@
           </p:nvSpPr>
           <p:spPr>
             <a:xfrm>
-              <a:off x="8612561" y="2022314"/>
+              <a:off x="8511852" y="2022190"/>
               <a:ext cx="63202" cy="63202"/>
             </a:xfrm>
             <a:custGeom>
@@ -12086,7 +12086,7 @@
           </p:nvSpPr>
           <p:spPr>
             <a:xfrm>
-              <a:off x="8563879" y="3389799"/>
+              <a:off x="8469664" y="3390009"/>
               <a:ext cx="63202" cy="63202"/>
             </a:xfrm>
             <a:custGeom>
@@ -13854,7 +13854,7 @@
           </p:nvSpPr>
           <p:spPr>
             <a:xfrm>
-              <a:off x="1210339" y="5722718"/>
+              <a:off x="1210339" y="5722805"/>
               <a:ext cx="186466" cy="81746"/>
             </a:xfrm>
             <a:prstGeom prst="rect">
@@ -13900,7 +13900,7 @@
           </p:nvSpPr>
           <p:spPr>
             <a:xfrm>
-              <a:off x="1210339" y="4330624"/>
+              <a:off x="1210339" y="4330692"/>
               <a:ext cx="186466" cy="81691"/>
             </a:xfrm>
             <a:prstGeom prst="rect">
@@ -13946,7 +13946,7 @@
           </p:nvSpPr>
           <p:spPr>
             <a:xfrm>
-              <a:off x="1210339" y="2938475"/>
+              <a:off x="1210339" y="2938525"/>
               <a:ext cx="186466" cy="81691"/>
             </a:xfrm>
             <a:prstGeom prst="rect">
@@ -13992,7 +13992,7 @@
           </p:nvSpPr>
           <p:spPr>
             <a:xfrm>
-              <a:off x="1148183" y="1546326"/>
+              <a:off x="1148183" y="1546358"/>
               <a:ext cx="248622" cy="81691"/>
             </a:xfrm>
             <a:prstGeom prst="rect">
@@ -14038,7 +14038,7 @@
           </p:nvSpPr>
           <p:spPr>
             <a:xfrm>
-              <a:off x="1424641" y="5764465"/>
+              <a:off x="1424641" y="5764551"/>
               <a:ext cx="34794" cy="0"/>
             </a:xfrm>
             <a:custGeom>
@@ -14078,7 +14078,7 @@
           </p:nvSpPr>
           <p:spPr>
             <a:xfrm>
-              <a:off x="1424641" y="4372316"/>
+              <a:off x="1424641" y="4372384"/>
               <a:ext cx="34794" cy="0"/>
             </a:xfrm>
             <a:custGeom>
@@ -14118,7 +14118,7 @@
           </p:nvSpPr>
           <p:spPr>
             <a:xfrm>
-              <a:off x="1424641" y="2980167"/>
+              <a:off x="1424641" y="2980217"/>
               <a:ext cx="34794" cy="0"/>
             </a:xfrm>
             <a:custGeom>
@@ -14158,7 +14158,7 @@
           </p:nvSpPr>
           <p:spPr>
             <a:xfrm>
-              <a:off x="1424641" y="1588018"/>
+              <a:off x="1424641" y="1588050"/>
               <a:ext cx="34794" cy="0"/>
             </a:xfrm>
             <a:custGeom>

</xml_diff>